<commit_message>
Updates to 3D calculations code
</commit_message>
<xml_diff>
--- a/Progress/3D_Calcs.pptx
+++ b/Progress/3D_Calcs.pptx
@@ -18,15 +18,14 @@
     <p:sldId id="263" r:id="rId12"/>
     <p:sldId id="256" r:id="rId13"/>
     <p:sldId id="268" r:id="rId14"/>
-    <p:sldId id="269" r:id="rId15"/>
-    <p:sldId id="270" r:id="rId16"/>
-    <p:sldId id="271" r:id="rId17"/>
-    <p:sldId id="272" r:id="rId18"/>
-    <p:sldId id="275" r:id="rId19"/>
-    <p:sldId id="276" r:id="rId20"/>
-    <p:sldId id="274" r:id="rId21"/>
-    <p:sldId id="273" r:id="rId22"/>
-    <p:sldId id="277" r:id="rId23"/>
+    <p:sldId id="270" r:id="rId15"/>
+    <p:sldId id="271" r:id="rId16"/>
+    <p:sldId id="272" r:id="rId17"/>
+    <p:sldId id="275" r:id="rId18"/>
+    <p:sldId id="276" r:id="rId19"/>
+    <p:sldId id="273" r:id="rId20"/>
+    <p:sldId id="277" r:id="rId21"/>
+    <p:sldId id="278" r:id="rId22"/>
   </p:sldIdLst>
   <p:sldSz cx="12192000" cy="6858000"/>
   <p:notesSz cx="6858000" cy="9144000"/>
@@ -280,7 +279,7 @@
           <a:p>
             <a:fld id="{6BD5D3B6-5CA1-4C9B-8367-FA96701F1B34}" type="datetimeFigureOut">
               <a:rPr lang="en-US" smtClean="0"/>
-              <a:t>10/25/2023</a:t>
+              <a:t>11/5/2023</a:t>
             </a:fld>
             <a:endParaRPr lang="en-US"/>
           </a:p>
@@ -478,7 +477,7 @@
           <a:p>
             <a:fld id="{6BD5D3B6-5CA1-4C9B-8367-FA96701F1B34}" type="datetimeFigureOut">
               <a:rPr lang="en-US" smtClean="0"/>
-              <a:t>10/25/2023</a:t>
+              <a:t>11/5/2023</a:t>
             </a:fld>
             <a:endParaRPr lang="en-US"/>
           </a:p>
@@ -686,7 +685,7 @@
           <a:p>
             <a:fld id="{6BD5D3B6-5CA1-4C9B-8367-FA96701F1B34}" type="datetimeFigureOut">
               <a:rPr lang="en-US" smtClean="0"/>
-              <a:t>10/25/2023</a:t>
+              <a:t>11/5/2023</a:t>
             </a:fld>
             <a:endParaRPr lang="en-US"/>
           </a:p>
@@ -884,7 +883,7 @@
           <a:p>
             <a:fld id="{6BD5D3B6-5CA1-4C9B-8367-FA96701F1B34}" type="datetimeFigureOut">
               <a:rPr lang="en-US" smtClean="0"/>
-              <a:t>10/25/2023</a:t>
+              <a:t>11/5/2023</a:t>
             </a:fld>
             <a:endParaRPr lang="en-US"/>
           </a:p>
@@ -1159,7 +1158,7 @@
           <a:p>
             <a:fld id="{6BD5D3B6-5CA1-4C9B-8367-FA96701F1B34}" type="datetimeFigureOut">
               <a:rPr lang="en-US" smtClean="0"/>
-              <a:t>10/25/2023</a:t>
+              <a:t>11/5/2023</a:t>
             </a:fld>
             <a:endParaRPr lang="en-US"/>
           </a:p>
@@ -1424,7 +1423,7 @@
           <a:p>
             <a:fld id="{6BD5D3B6-5CA1-4C9B-8367-FA96701F1B34}" type="datetimeFigureOut">
               <a:rPr lang="en-US" smtClean="0"/>
-              <a:t>10/25/2023</a:t>
+              <a:t>11/5/2023</a:t>
             </a:fld>
             <a:endParaRPr lang="en-US"/>
           </a:p>
@@ -1836,7 +1835,7 @@
           <a:p>
             <a:fld id="{6BD5D3B6-5CA1-4C9B-8367-FA96701F1B34}" type="datetimeFigureOut">
               <a:rPr lang="en-US" smtClean="0"/>
-              <a:t>10/25/2023</a:t>
+              <a:t>11/5/2023</a:t>
             </a:fld>
             <a:endParaRPr lang="en-US"/>
           </a:p>
@@ -1977,7 +1976,7 @@
           <a:p>
             <a:fld id="{6BD5D3B6-5CA1-4C9B-8367-FA96701F1B34}" type="datetimeFigureOut">
               <a:rPr lang="en-US" smtClean="0"/>
-              <a:t>10/25/2023</a:t>
+              <a:t>11/5/2023</a:t>
             </a:fld>
             <a:endParaRPr lang="en-US"/>
           </a:p>
@@ -2090,7 +2089,7 @@
           <a:p>
             <a:fld id="{6BD5D3B6-5CA1-4C9B-8367-FA96701F1B34}" type="datetimeFigureOut">
               <a:rPr lang="en-US" smtClean="0"/>
-              <a:t>10/25/2023</a:t>
+              <a:t>11/5/2023</a:t>
             </a:fld>
             <a:endParaRPr lang="en-US"/>
           </a:p>
@@ -2401,7 +2400,7 @@
           <a:p>
             <a:fld id="{6BD5D3B6-5CA1-4C9B-8367-FA96701F1B34}" type="datetimeFigureOut">
               <a:rPr lang="en-US" smtClean="0"/>
-              <a:t>10/25/2023</a:t>
+              <a:t>11/5/2023</a:t>
             </a:fld>
             <a:endParaRPr lang="en-US"/>
           </a:p>
@@ -2689,7 +2688,7 @@
           <a:p>
             <a:fld id="{6BD5D3B6-5CA1-4C9B-8367-FA96701F1B34}" type="datetimeFigureOut">
               <a:rPr lang="en-US" smtClean="0"/>
-              <a:t>10/25/2023</a:t>
+              <a:t>11/5/2023</a:t>
             </a:fld>
             <a:endParaRPr lang="en-US"/>
           </a:p>
@@ -2930,7 +2929,7 @@
           <a:p>
             <a:fld id="{6BD5D3B6-5CA1-4C9B-8367-FA96701F1B34}" type="datetimeFigureOut">
               <a:rPr lang="en-US" smtClean="0"/>
-              <a:t>10/25/2023</a:t>
+              <a:t>11/5/2023</a:t>
             </a:fld>
             <a:endParaRPr lang="en-US"/>
           </a:p>
@@ -4206,115 +4205,6 @@
           <p:cNvPr id="2" name="Title 1">
             <a:extLst>
               <a:ext uri="{FF2B5EF4-FFF2-40B4-BE49-F238E27FC236}">
-                <a16:creationId xmlns:a16="http://schemas.microsoft.com/office/drawing/2014/main" id="{B26A034C-7A53-86F7-D250-A157836FF6DA}"/>
-              </a:ext>
-            </a:extLst>
-          </p:cNvPr>
-          <p:cNvSpPr>
-            <a:spLocks noGrp="1"/>
-          </p:cNvSpPr>
-          <p:nvPr>
-            <p:ph type="title"/>
-          </p:nvPr>
-        </p:nvSpPr>
-        <p:spPr/>
-        <p:txBody>
-          <a:bodyPr/>
-          <a:lstStyle/>
-          <a:p>
-            <a:r>
-              <a:rPr lang="en-US" dirty="0">
-                <a:solidFill>
-                  <a:srgbClr val="FF0000"/>
-                </a:solidFill>
-              </a:rPr>
-              <a:t>CURRENT PROBLEMS!!!</a:t>
-            </a:r>
-          </a:p>
-        </p:txBody>
-      </p:sp>
-      <p:sp>
-        <p:nvSpPr>
-          <p:cNvPr id="3" name="Content Placeholder 2">
-            <a:extLst>
-              <a:ext uri="{FF2B5EF4-FFF2-40B4-BE49-F238E27FC236}">
-                <a16:creationId xmlns:a16="http://schemas.microsoft.com/office/drawing/2014/main" id="{D144C6DB-D6CB-CF04-CA8B-B349B12F369C}"/>
-              </a:ext>
-            </a:extLst>
-          </p:cNvPr>
-          <p:cNvSpPr>
-            <a:spLocks noGrp="1"/>
-          </p:cNvSpPr>
-          <p:nvPr>
-            <p:ph idx="1"/>
-          </p:nvPr>
-        </p:nvSpPr>
-        <p:spPr/>
-        <p:txBody>
-          <a:bodyPr/>
-          <a:lstStyle/>
-          <a:p>
-            <a:r>
-              <a:rPr lang="en-US" dirty="0"/>
-              <a:t>The current version of the calculations require surface roughness and canopy height.</a:t>
-            </a:r>
-          </a:p>
-          <a:p>
-            <a:pPr lvl="1"/>
-            <a:r>
-              <a:rPr lang="en-US" dirty="0"/>
-              <a:t>BUT the current version is not giving the right relationship, so there is a bug somewhere.</a:t>
-            </a:r>
-          </a:p>
-          <a:p>
-            <a:r>
-              <a:rPr lang="en-US" dirty="0"/>
-              <a:t>These should be inputs to the WRF model, and therefore should already be defined, but I can’t find them.</a:t>
-            </a:r>
-          </a:p>
-          <a:p>
-            <a:r>
-              <a:rPr lang="en-US" dirty="0"/>
-              <a:t>For the worked example, I used placeholder values</a:t>
-            </a:r>
-          </a:p>
-        </p:txBody>
-      </p:sp>
-    </p:spTree>
-    <p:extLst>
-      <p:ext uri="{BB962C8B-B14F-4D97-AF65-F5344CB8AC3E}">
-        <p14:creationId xmlns:p14="http://schemas.microsoft.com/office/powerpoint/2010/main" val="949815788"/>
-      </p:ext>
-    </p:extLst>
-  </p:cSld>
-  <p:clrMapOvr>
-    <a:masterClrMapping/>
-  </p:clrMapOvr>
-</p:sld>
-</file>
-
-<file path=ppt/slides/slide15.xml><?xml version="1.0" encoding="utf-8"?>
-<p:sld xmlns:a="http://schemas.openxmlformats.org/drawingml/2006/main" xmlns:r="http://schemas.openxmlformats.org/officeDocument/2006/relationships" xmlns:p="http://schemas.openxmlformats.org/presentationml/2006/main">
-  <p:cSld>
-    <p:spTree>
-      <p:nvGrpSpPr>
-        <p:cNvPr id="1" name=""/>
-        <p:cNvGrpSpPr/>
-        <p:nvPr/>
-      </p:nvGrpSpPr>
-      <p:grpSpPr>
-        <a:xfrm>
-          <a:off x="0" y="0"/>
-          <a:ext cx="0" cy="0"/>
-          <a:chOff x="0" y="0"/>
-          <a:chExt cx="0" cy="0"/>
-        </a:xfrm>
-      </p:grpSpPr>
-      <p:sp>
-        <p:nvSpPr>
-          <p:cNvPr id="2" name="Title 1">
-            <a:extLst>
-              <a:ext uri="{FF2B5EF4-FFF2-40B4-BE49-F238E27FC236}">
                 <a16:creationId xmlns:a16="http://schemas.microsoft.com/office/drawing/2014/main" id="{FD1909C7-8842-B57D-EB76-48C4A030747E}"/>
               </a:ext>
             </a:extLst>
@@ -4335,8 +4225,8 @@
           </a:p>
         </p:txBody>
       </p:sp>
-      <mc:AlternateContent xmlns:mc="http://schemas.openxmlformats.org/markup-compatibility/2006">
-        <mc:Choice xmlns:a14="http://schemas.microsoft.com/office/drawing/2010/main" Requires="a14">
+      <mc:AlternateContent xmlns:mc="http://schemas.openxmlformats.org/markup-compatibility/2006" xmlns:a14="http://schemas.microsoft.com/office/drawing/2010/main">
+        <mc:Choice Requires="a14">
           <p:sp>
             <p:nvSpPr>
               <p:cNvPr id="5" name="TextBox 4">
@@ -4365,6 +4255,7 @@
               </a:bodyPr>
               <a:lstStyle/>
               <a:p>
+                <a:pPr/>
                 <a14:m>
                   <m:oMathPara xmlns:m="http://schemas.openxmlformats.org/officeDocument/2006/math">
                     <m:oMathParaPr>
@@ -4763,7 +4654,7 @@
             </p:txBody>
           </p:sp>
         </mc:Choice>
-        <mc:Fallback>
+        <mc:Fallback xmlns="">
           <p:sp>
             <p:nvSpPr>
               <p:cNvPr id="5" name="TextBox 4">
@@ -4808,8 +4699,8 @@
           </p:sp>
         </mc:Fallback>
       </mc:AlternateContent>
-      <mc:AlternateContent xmlns:mc="http://schemas.openxmlformats.org/markup-compatibility/2006">
-        <mc:Choice xmlns:a14="http://schemas.microsoft.com/office/drawing/2010/main" Requires="a14">
+      <mc:AlternateContent xmlns:mc="http://schemas.openxmlformats.org/markup-compatibility/2006" xmlns:a14="http://schemas.microsoft.com/office/drawing/2010/main">
+        <mc:Choice Requires="a14">
           <p:sp>
             <p:nvSpPr>
               <p:cNvPr id="6" name="TextBox 5">
@@ -4838,6 +4729,7 @@
               </a:bodyPr>
               <a:lstStyle/>
               <a:p>
+                <a:pPr/>
                 <a14:m>
                   <m:oMathPara xmlns:m="http://schemas.openxmlformats.org/officeDocument/2006/math">
                     <m:oMathParaPr>
@@ -5066,7 +4958,7 @@
             </p:txBody>
           </p:sp>
         </mc:Choice>
-        <mc:Fallback>
+        <mc:Fallback xmlns="">
           <p:sp>
             <p:nvSpPr>
               <p:cNvPr id="6" name="TextBox 5">
@@ -5285,7 +5177,7 @@
 </p:sld>
 </file>
 
-<file path=ppt/slides/slide16.xml><?xml version="1.0" encoding="utf-8"?>
+<file path=ppt/slides/slide15.xml><?xml version="1.0" encoding="utf-8"?>
 <p:sld xmlns:a="http://schemas.openxmlformats.org/drawingml/2006/main" xmlns:r="http://schemas.openxmlformats.org/officeDocument/2006/relationships" xmlns:p="http://schemas.openxmlformats.org/presentationml/2006/main">
   <p:cSld>
     <p:spTree>
@@ -5348,8 +5240,8 @@
         </p:nvSpPr>
         <p:spPr>
           <a:xfrm>
-            <a:off x="838200" y="1825625"/>
-            <a:ext cx="10515600" cy="1195481"/>
+            <a:off x="838200" y="1825626"/>
+            <a:ext cx="10515600" cy="675528"/>
           </a:xfrm>
         </p:spPr>
         <p:txBody>
@@ -5357,23 +5249,8 @@
           <a:lstStyle/>
           <a:p>
             <a:r>
-              <a:rPr lang="en-US" dirty="0">
-                <a:solidFill>
-                  <a:srgbClr val="FF0000"/>
-                </a:solidFill>
-              </a:rPr>
-              <a:t>Is this the downscaling equation we want to use???</a:t>
-            </a:r>
-          </a:p>
-          <a:p>
-            <a:pPr lvl="1"/>
-            <a:r>
-              <a:rPr lang="en-US" dirty="0">
-                <a:solidFill>
-                  <a:srgbClr val="FF0000"/>
-                </a:solidFill>
-              </a:rPr>
-              <a:t>Source: Wikipedia!!! (via a ResearchGate answer)</a:t>
+              <a:rPr lang="en-US" dirty="0"/>
+              <a:t>Adjust wind speed to canopy height</a:t>
             </a:r>
           </a:p>
         </p:txBody>
@@ -5394,7 +5271,7 @@
             </p:nvSpPr>
             <p:spPr>
               <a:xfrm>
-                <a:off x="3182471" y="2809626"/>
+                <a:off x="3137647" y="2465296"/>
                 <a:ext cx="2739211" cy="1027269"/>
               </a:xfrm>
               <a:prstGeom prst="rect">
@@ -5408,6 +5285,7 @@
               </a:bodyPr>
               <a:lstStyle/>
               <a:p>
+                <a:pPr/>
                 <a14:m>
                   <m:oMathPara xmlns:m="http://schemas.openxmlformats.org/officeDocument/2006/math">
                     <m:oMathParaPr>
@@ -5474,7 +5352,7 @@
                         <a:rPr lang="pl-PL" i="1">
                           <a:latin typeface="Cambria Math" panose="02040503050406030204" pitchFamily="18" charset="0"/>
                         </a:rPr>
-                        <m:t> * </m:t>
+                        <m:t> ∗ </m:t>
                       </m:r>
                       <m:f>
                         <m:fPr>
@@ -5648,7 +5526,7 @@
             </p:nvSpPr>
             <p:spPr>
               <a:xfrm>
-                <a:off x="3182471" y="2809626"/>
+                <a:off x="3137647" y="2465296"/>
                 <a:ext cx="2739211" cy="1027269"/>
               </a:xfrm>
               <a:prstGeom prst="rect">
@@ -5690,8 +5568,8 @@
         </p:nvSpPr>
         <p:spPr>
           <a:xfrm>
-            <a:off x="2716305" y="4078940"/>
-            <a:ext cx="7225553" cy="1754326"/>
+            <a:off x="3003176" y="3693458"/>
+            <a:ext cx="7225553" cy="1477328"/>
           </a:xfrm>
           <a:prstGeom prst="rect">
             <a:avLst/>
@@ -5754,7 +5632,7 @@
             </a:r>
             <a:r>
               <a:rPr lang="en-US" dirty="0"/>
-              <a:t> = zero plane displacement (height in meters above the ground at which zero mean speed is achieved, Wikipedia says it can be approximated as 2/3 to ¾ of the average height of the obstacles)</a:t>
+              <a:t> = zero plane displacement (height in meters above the ground at which zero mean speed is achieved, approximated as 0.65 * canopy height)</a:t>
             </a:r>
           </a:p>
           <a:p>
@@ -5772,16 +5650,13 @@
             </a:r>
             <a:r>
               <a:rPr lang="en-US" dirty="0"/>
-              <a:t>= surface roughness </a:t>
+              <a:t>= surface roughness (either 0.1 * canopy height or from WRF model)</a:t>
             </a:r>
-            <a:r>
-              <a:rPr lang="en-US" dirty="0">
-                <a:highlight>
-                  <a:srgbClr val="FFFF00"/>
-                </a:highlight>
-              </a:rPr>
-              <a:t>#**# ADD DETAILS</a:t>
-            </a:r>
+            <a:endParaRPr lang="en-US" dirty="0">
+              <a:highlight>
+                <a:srgbClr val="FFFF00"/>
+              </a:highlight>
+            </a:endParaRPr>
           </a:p>
         </p:txBody>
       </p:sp>
@@ -5798,7 +5673,7 @@
 </p:sld>
 </file>
 
-<file path=ppt/slides/slide17.xml><?xml version="1.0" encoding="utf-8"?>
+<file path=ppt/slides/slide16.xml><?xml version="1.0" encoding="utf-8"?>
 <p:sld xmlns:a="http://schemas.openxmlformats.org/drawingml/2006/main" xmlns:r="http://schemas.openxmlformats.org/officeDocument/2006/relationships" xmlns:p="http://schemas.openxmlformats.org/presentationml/2006/main">
   <p:cSld>
     <p:spTree>
@@ -5892,7 +5767,7 @@
             </a:r>
             <a:r>
               <a:rPr lang="en-US" dirty="0"/>
-              <a:t> = 2 m</a:t>
+              <a:t> = 35 m</a:t>
             </a:r>
           </a:p>
           <a:p>
@@ -5910,7 +5785,7 @@
             </a:r>
             <a:r>
               <a:rPr lang="en-US" dirty="0"/>
-              <a:t>= mean(sqrt(U</a:t>
+              <a:t>= sqrt(U</a:t>
             </a:r>
             <a:r>
               <a:rPr lang="en-US" baseline="-25000" dirty="0"/>
@@ -5934,7 +5809,7 @@
             </a:r>
             <a:r>
               <a:rPr lang="en-US" dirty="0"/>
-              <a:t>)) # Convert to a daily mean wind speed</a:t>
+              <a:t>) # Convert to wind speed</a:t>
             </a:r>
           </a:p>
           <a:p>
@@ -5948,7 +5823,7 @@
             </a:r>
             <a:r>
               <a:rPr lang="en-US" dirty="0"/>
-              <a:t>= </a:t>
+              <a:t>= 3.850759</a:t>
             </a:r>
             <a:endParaRPr lang="en-US" baseline="-25000" dirty="0"/>
           </a:p>
@@ -5961,130 +5836,25 @@
           <a:p>
             <a:r>
               <a:rPr lang="en-US" dirty="0"/>
-              <a:t>Vegetation category: 13 # not currently linked to anything</a:t>
+              <a:t>Vegetation category: 13 (evergreen broadleaf forest)</a:t>
             </a:r>
           </a:p>
           <a:p>
             <a:r>
               <a:rPr lang="en-US" dirty="0"/>
-              <a:t>d = 2/3 * 1    # </a:t>
-            </a:r>
-            <a:r>
-              <a:rPr lang="en-US" dirty="0">
-                <a:solidFill>
-                  <a:srgbClr val="FF0000"/>
-                </a:solidFill>
-              </a:rPr>
-              <a:t>Placeholder – assume 2/3 and 1 m height.</a:t>
+              <a:t>d = 0.65 * 35 = 22.75</a:t>
             </a:r>
           </a:p>
           <a:p>
             <a:r>
               <a:rPr lang="en-US" dirty="0"/>
-              <a:t>roughness = 0.75</a:t>
+              <a:t>roughness = 0.5 (from WRF, 3.5 if using 0.1 * canopy height)</a:t>
             </a:r>
-            <a:r>
-              <a:rPr lang="en-US" dirty="0">
-                <a:solidFill>
-                  <a:srgbClr val="FF0000"/>
-                </a:solidFill>
-              </a:rPr>
-              <a:t> # Placeholder.</a:t>
-            </a:r>
-          </a:p>
-        </p:txBody>
-      </p:sp>
-      <p:sp>
-        <p:nvSpPr>
-          <p:cNvPr id="5" name="TextBox 4">
-            <a:extLst>
-              <a:ext uri="{FF2B5EF4-FFF2-40B4-BE49-F238E27FC236}">
-                <a16:creationId xmlns:a16="http://schemas.microsoft.com/office/drawing/2014/main" id="{596C5886-CC73-0E10-4AA1-AA524ABDC44A}"/>
-              </a:ext>
-            </a:extLst>
-          </p:cNvPr>
-          <p:cNvSpPr txBox="1"/>
-          <p:nvPr/>
-        </p:nvSpPr>
-        <p:spPr>
-          <a:xfrm>
-            <a:off x="5475284" y="3334465"/>
-            <a:ext cx="5534092" cy="646331"/>
-          </a:xfrm>
-          <a:prstGeom prst="rect">
-            <a:avLst/>
-          </a:prstGeom>
-          <a:noFill/>
-        </p:spPr>
-        <p:txBody>
-          <a:bodyPr wrap="square" rtlCol="0">
-            <a:spAutoFit/>
-          </a:bodyPr>
-          <a:lstStyle/>
-          <a:p>
-            <a:r>
-              <a:rPr lang="en-US" dirty="0">
-                <a:highlight>
-                  <a:srgbClr val="FFFF00"/>
-                </a:highlight>
-              </a:rPr>
-              <a:t>Why daily here??? </a:t>
-            </a:r>
-            <a:r>
-              <a:rPr lang="en-US" dirty="0"/>
-              <a:t>(Artifact – calculated daily </a:t>
-            </a:r>
-            <a:r>
-              <a:rPr lang="en-US" dirty="0" err="1"/>
-              <a:t>lcw</a:t>
-            </a:r>
-            <a:r>
-              <a:rPr lang="en-US" dirty="0"/>
-              <a:t> earlier, but that was the last step at that point.</a:t>
-            </a:r>
-          </a:p>
-        </p:txBody>
-      </p:sp>
-      <p:sp>
-        <p:nvSpPr>
-          <p:cNvPr id="7" name="TextBox 6">
-            <a:extLst>
-              <a:ext uri="{FF2B5EF4-FFF2-40B4-BE49-F238E27FC236}">
-                <a16:creationId xmlns:a16="http://schemas.microsoft.com/office/drawing/2014/main" id="{DAB30B77-CB4D-CC7B-95FC-DA0AB9356FA9}"/>
-              </a:ext>
-            </a:extLst>
-          </p:cNvPr>
-          <p:cNvSpPr txBox="1"/>
-          <p:nvPr/>
-        </p:nvSpPr>
-        <p:spPr>
-          <a:xfrm>
-            <a:off x="8242330" y="3964109"/>
-            <a:ext cx="4567518" cy="646331"/>
-          </a:xfrm>
-          <a:prstGeom prst="rect">
-            <a:avLst/>
-          </a:prstGeom>
-          <a:noFill/>
-        </p:spPr>
-        <p:txBody>
-          <a:bodyPr wrap="square" rtlCol="0">
-            <a:spAutoFit/>
-          </a:bodyPr>
-          <a:lstStyle/>
-          <a:p>
-            <a:pPr marL="285750" indent="-285750">
-              <a:buFont typeface="Arial" panose="020B0604020202020204" pitchFamily="34" charset="0"/>
-              <a:buChar char="•"/>
-            </a:pPr>
-            <a:r>
-              <a:rPr lang="en-US" dirty="0">
-                <a:solidFill>
-                  <a:srgbClr val="FF0000"/>
-                </a:solidFill>
-              </a:rPr>
-              <a:t>There is a vegetation category for every hour – does this parameter change?</a:t>
-            </a:r>
+            <a:endParaRPr lang="en-US" dirty="0">
+              <a:solidFill>
+                <a:srgbClr val="FF0000"/>
+              </a:solidFill>
+            </a:endParaRPr>
           </a:p>
         </p:txBody>
       </p:sp>
@@ -6102,8 +5872,8 @@
         </p:nvSpPr>
         <p:spPr>
           <a:xfrm>
-            <a:off x="7185696" y="5607886"/>
-            <a:ext cx="5052024" cy="646331"/>
+            <a:off x="3984812" y="4479052"/>
+            <a:ext cx="6056979" cy="369332"/>
           </a:xfrm>
           <a:prstGeom prst="rect">
             <a:avLst/>
@@ -6125,20 +5895,7 @@
                   <a:srgbClr val="FFFF00"/>
                 </a:highlight>
               </a:rPr>
-              <a:t>10 m canopy height for 0 wind speed does not work</a:t>
-            </a:r>
-          </a:p>
-          <a:p>
-            <a:r>
-              <a:rPr lang="en-US" dirty="0">
-                <a:solidFill>
-                  <a:srgbClr val="FF0000"/>
-                </a:solidFill>
-                <a:highlight>
-                  <a:srgbClr val="FFFF00"/>
-                </a:highlight>
-              </a:rPr>
-              <a:t>2 m wind speed would be below the 0 wind height!</a:t>
+              <a:t>Problem: 10 m height is BELOW assumed 0 wind speed height!</a:t>
             </a:r>
           </a:p>
         </p:txBody>
@@ -6156,7 +5913,7 @@
 </p:sld>
 </file>
 
-<file path=ppt/slides/slide18.xml><?xml version="1.0" encoding="utf-8"?>
+<file path=ppt/slides/slide17.xml><?xml version="1.0" encoding="utf-8"?>
 <p:sld xmlns:a="http://schemas.openxmlformats.org/drawingml/2006/main" xmlns:r="http://schemas.openxmlformats.org/officeDocument/2006/relationships" xmlns:p="http://schemas.openxmlformats.org/presentationml/2006/main">
   <p:cSld>
     <p:spTree>
@@ -6198,8 +5955,8 @@
           </a:p>
         </p:txBody>
       </p:sp>
-      <mc:AlternateContent xmlns:mc="http://schemas.openxmlformats.org/markup-compatibility/2006">
-        <mc:Choice xmlns:a14="http://schemas.microsoft.com/office/drawing/2010/main" Requires="a14">
+      <mc:AlternateContent xmlns:mc="http://schemas.openxmlformats.org/markup-compatibility/2006" xmlns:a14="http://schemas.microsoft.com/office/drawing/2010/main">
+        <mc:Choice Requires="a14">
           <p:sp>
             <p:nvSpPr>
               <p:cNvPr id="4" name="TextBox 3">
@@ -6228,6 +5985,7 @@
               </a:bodyPr>
               <a:lstStyle/>
               <a:p>
+                <a:pPr/>
                 <a14:m>
                   <m:oMathPara xmlns:m="http://schemas.openxmlformats.org/officeDocument/2006/math">
                     <m:oMathParaPr>
@@ -6294,7 +6052,7 @@
                         <a:rPr lang="pl-PL" i="1">
                           <a:latin typeface="Cambria Math" panose="02040503050406030204" pitchFamily="18" charset="0"/>
                         </a:rPr>
-                        <m:t> * </m:t>
+                        <m:t> ∗ </m:t>
                       </m:r>
                       <m:f>
                         <m:fPr>
@@ -6451,7 +6209,7 @@
             </p:txBody>
           </p:sp>
         </mc:Choice>
-        <mc:Fallback>
+        <mc:Fallback xmlns="">
           <p:sp>
             <p:nvSpPr>
               <p:cNvPr id="4" name="TextBox 3">
@@ -6513,7 +6271,7 @@
             <p:spPr>
               <a:xfrm>
                 <a:off x="1386327" y="3303515"/>
-                <a:ext cx="3156505" cy="1016240"/>
+                <a:ext cx="3233449" cy="1032142"/>
               </a:xfrm>
               <a:prstGeom prst="rect">
                 <a:avLst/>
@@ -6526,6 +6284,7 @@
               </a:bodyPr>
               <a:lstStyle/>
               <a:p>
+                <a:pPr/>
                 <a14:m>
                   <m:oMathPara xmlns:m="http://schemas.openxmlformats.org/officeDocument/2006/math">
                     <m:oMathParaPr>
@@ -6567,13 +6326,13 @@
                         <a:rPr lang="en-US" b="0" i="1" smtClean="0">
                           <a:latin typeface="Cambria Math" panose="02040503050406030204" pitchFamily="18" charset="0"/>
                         </a:rPr>
-                        <m:t>1.755</m:t>
+                        <m:t>3.85</m:t>
                       </m:r>
                       <m:r>
                         <a:rPr lang="pl-PL" i="1">
                           <a:latin typeface="Cambria Math" panose="02040503050406030204" pitchFamily="18" charset="0"/>
                         </a:rPr>
-                        <m:t>* </m:t>
+                        <m:t>∗ </m:t>
                       </m:r>
                       <m:f>
                         <m:fPr>
@@ -6609,7 +6368,7 @@
                                 <a:rPr lang="en-US" b="0" i="1" smtClean="0">
                                   <a:latin typeface="Cambria Math" panose="02040503050406030204" pitchFamily="18" charset="0"/>
                                 </a:rPr>
-                                <m:t>2</m:t>
+                                <m:t>35</m:t>
                               </m:r>
                               <m:r>
                                 <a:rPr lang="pl-PL" i="1">
@@ -6621,7 +6380,7 @@
                                 <a:rPr lang="en-US" b="0" i="1" smtClean="0">
                                   <a:latin typeface="Cambria Math" panose="02040503050406030204" pitchFamily="18" charset="0"/>
                                 </a:rPr>
-                                <m:t>0.67</m:t>
+                                <m:t>22.75</m:t>
                               </m:r>
                             </m:num>
                             <m:den>
@@ -6629,7 +6388,13 @@
                                 <a:rPr lang="en-US" b="0" i="1" smtClean="0">
                                   <a:latin typeface="Cambria Math" panose="02040503050406030204" pitchFamily="18" charset="0"/>
                                 </a:rPr>
-                                <m:t>0.75</m:t>
+                                <m:t>0.</m:t>
+                              </m:r>
+                              <m:r>
+                                <a:rPr lang="en-US" b="0" i="1" smtClean="0">
+                                  <a:latin typeface="Cambria Math" panose="02040503050406030204" pitchFamily="18" charset="0"/>
+                                </a:rPr>
+                                <m:t>50</m:t>
                               </m:r>
                             </m:den>
                           </m:f>
@@ -6678,7 +6443,7 @@
                                 <a:rPr lang="en-US" b="0" i="1" smtClean="0">
                                   <a:latin typeface="Cambria Math" panose="02040503050406030204" pitchFamily="18" charset="0"/>
                                 </a:rPr>
-                                <m:t>0.67</m:t>
+                                <m:t>22.75</m:t>
                               </m:r>
                             </m:num>
                             <m:den>
@@ -6686,7 +6451,13 @@
                                 <a:rPr lang="en-US" b="0" i="1" smtClean="0">
                                   <a:latin typeface="Cambria Math" panose="02040503050406030204" pitchFamily="18" charset="0"/>
                                 </a:rPr>
-                                <m:t>0.75</m:t>
+                                <m:t>0.</m:t>
+                              </m:r>
+                              <m:r>
+                                <a:rPr lang="en-US" b="0" i="1" smtClean="0">
+                                  <a:latin typeface="Cambria Math" panose="02040503050406030204" pitchFamily="18" charset="0"/>
+                                </a:rPr>
+                                <m:t>50</m:t>
                               </m:r>
                             </m:den>
                           </m:f>
@@ -6724,7 +6495,7 @@
             <p:spPr>
               <a:xfrm>
                 <a:off x="1386327" y="3303515"/>
-                <a:ext cx="3156505" cy="1016240"/>
+                <a:ext cx="3233449" cy="1032142"/>
               </a:xfrm>
               <a:prstGeom prst="rect">
                 <a:avLst/>
@@ -6768,7 +6539,7 @@
             <p:spPr>
               <a:xfrm>
                 <a:off x="1386327" y="4524256"/>
-                <a:ext cx="1369990" cy="369332"/>
+                <a:ext cx="1253613" cy="369332"/>
               </a:xfrm>
               <a:prstGeom prst="rect">
                 <a:avLst/>
@@ -6781,6 +6552,7 @@
               </a:bodyPr>
               <a:lstStyle/>
               <a:p>
+                <a:pPr/>
                 <a14:m>
                   <m:oMathPara xmlns:m="http://schemas.openxmlformats.org/officeDocument/2006/math">
                     <m:oMathParaPr>
@@ -6822,7 +6594,7 @@
                         <a:rPr lang="en-US" b="0" i="1" smtClean="0">
                           <a:latin typeface="Cambria Math" panose="02040503050406030204" pitchFamily="18" charset="0"/>
                         </a:rPr>
-                        <m:t>7.69</m:t>
+                        <m:t>𝑁𝐴</m:t>
                       </m:r>
                     </m:oMath>
                   </m:oMathPara>
@@ -6850,7 +6622,7 @@
             <p:spPr>
               <a:xfrm>
                 <a:off x="1386327" y="4524256"/>
-                <a:ext cx="1369990" cy="369332"/>
+                <a:ext cx="1253613" cy="369332"/>
               </a:xfrm>
               <a:prstGeom prst="rect">
                 <a:avLst/>
@@ -6879,10 +6651,10 @@
       </mc:AlternateContent>
       <p:sp>
         <p:nvSpPr>
-          <p:cNvPr id="8" name="TextBox 7">
-            <a:extLst>
-              <a:ext uri="{FF2B5EF4-FFF2-40B4-BE49-F238E27FC236}">
-                <a16:creationId xmlns:a16="http://schemas.microsoft.com/office/drawing/2014/main" id="{B42B2CA4-C3F0-99E7-B4C3-DE7718E3DA81}"/>
+          <p:cNvPr id="3" name="TextBox 2">
+            <a:extLst>
+              <a:ext uri="{FF2B5EF4-FFF2-40B4-BE49-F238E27FC236}">
+                <a16:creationId xmlns:a16="http://schemas.microsoft.com/office/drawing/2014/main" id="{B4AC0C6F-A724-EDCD-178C-D33CAC1AF8AC}"/>
               </a:ext>
             </a:extLst>
           </p:cNvPr>
@@ -6891,8 +6663,8 @@
         </p:nvSpPr>
         <p:spPr>
           <a:xfrm>
-            <a:off x="3070098" y="4537353"/>
-            <a:ext cx="3180743" cy="369332"/>
+            <a:off x="2729753" y="4524256"/>
+            <a:ext cx="6056979" cy="369332"/>
           </a:xfrm>
           <a:prstGeom prst="rect">
             <a:avLst/>
@@ -6907,124 +6679,361 @@
           <a:p>
             <a:r>
               <a:rPr lang="en-US" dirty="0">
+                <a:solidFill>
+                  <a:srgbClr val="FF0000"/>
+                </a:solidFill>
                 <a:highlight>
                   <a:srgbClr val="FFFF00"/>
                 </a:highlight>
               </a:rPr>
-              <a:t>* Well, that’s most likely wrong!</a:t>
+              <a:t>Problem: 10 m height is BELOW assumed 0 wind speed height!</a:t>
             </a:r>
           </a:p>
         </p:txBody>
       </p:sp>
-      <p:sp>
-        <p:nvSpPr>
-          <p:cNvPr id="9" name="TextBox 8">
-            <a:extLst>
-              <a:ext uri="{FF2B5EF4-FFF2-40B4-BE49-F238E27FC236}">
-                <a16:creationId xmlns:a16="http://schemas.microsoft.com/office/drawing/2014/main" id="{95E8B5AB-162C-FAC7-7A2A-EF2B591D2E09}"/>
-              </a:ext>
-            </a:extLst>
-          </p:cNvPr>
-          <p:cNvSpPr txBox="1"/>
-          <p:nvPr/>
-        </p:nvSpPr>
-        <p:spPr>
-          <a:xfrm>
-            <a:off x="6405123" y="4524256"/>
-            <a:ext cx="4857750" cy="646331"/>
-          </a:xfrm>
-          <a:prstGeom prst="rect">
-            <a:avLst/>
-          </a:prstGeom>
-          <a:noFill/>
-        </p:spPr>
-        <p:txBody>
-          <a:bodyPr wrap="square" rtlCol="0">
-            <a:spAutoFit/>
-          </a:bodyPr>
-          <a:lstStyle/>
-          <a:p>
-            <a:r>
-              <a:rPr lang="en-US" dirty="0">
-                <a:highlight>
-                  <a:srgbClr val="FFFF00"/>
-                </a:highlight>
-              </a:rPr>
-              <a:t>0.40 if Wikipedia transposed the numerator and denominator</a:t>
-            </a:r>
-          </a:p>
-        </p:txBody>
-      </p:sp>
-      <p:sp>
-        <p:nvSpPr>
-          <p:cNvPr id="10" name="TextBox 9">
-            <a:extLst>
-              <a:ext uri="{FF2B5EF4-FFF2-40B4-BE49-F238E27FC236}">
-                <a16:creationId xmlns:a16="http://schemas.microsoft.com/office/drawing/2014/main" id="{A82C56C2-15FC-6775-DC2F-9E7D43C8AF1E}"/>
-              </a:ext>
-            </a:extLst>
-          </p:cNvPr>
-          <p:cNvSpPr txBox="1"/>
-          <p:nvPr/>
-        </p:nvSpPr>
-        <p:spPr>
-          <a:xfrm>
-            <a:off x="1386327" y="5563250"/>
-            <a:ext cx="5764591" cy="369332"/>
-          </a:xfrm>
-          <a:prstGeom prst="rect">
-            <a:avLst/>
-          </a:prstGeom>
-          <a:noFill/>
-        </p:spPr>
-        <p:txBody>
-          <a:bodyPr wrap="none" rtlCol="0">
-            <a:spAutoFit/>
-          </a:bodyPr>
-          <a:lstStyle/>
-          <a:p>
-            <a:r>
-              <a:rPr lang="en-US" dirty="0"/>
-              <a:t>Changing roughness to 0.001 gives 2.23 (1.38 if transposed)</a:t>
-            </a:r>
-          </a:p>
-        </p:txBody>
-      </p:sp>
-      <p:sp>
-        <p:nvSpPr>
-          <p:cNvPr id="11" name="TextBox 10">
-            <a:extLst>
-              <a:ext uri="{FF2B5EF4-FFF2-40B4-BE49-F238E27FC236}">
-                <a16:creationId xmlns:a16="http://schemas.microsoft.com/office/drawing/2014/main" id="{B9467FA9-84F7-0A78-0C78-C22681C8EFBA}"/>
-              </a:ext>
-            </a:extLst>
-          </p:cNvPr>
-          <p:cNvSpPr txBox="1"/>
-          <p:nvPr/>
-        </p:nvSpPr>
-        <p:spPr>
-          <a:xfrm>
-            <a:off x="1261856" y="6408053"/>
-            <a:ext cx="9668288" cy="369332"/>
-          </a:xfrm>
-          <a:prstGeom prst="rect">
-            <a:avLst/>
-          </a:prstGeom>
-          <a:noFill/>
-        </p:spPr>
-        <p:txBody>
-          <a:bodyPr wrap="none" rtlCol="0">
-            <a:spAutoFit/>
-          </a:bodyPr>
-          <a:lstStyle/>
-          <a:p>
-            <a:r>
-              <a:rPr lang="en-US" dirty="0"/>
-              <a:t>Wikipedia cites: Holmes JD. Wind Loading of Structures. 3rd ed. Boca Raton, Florida: CRC Press; 2015.</a:t>
-            </a:r>
-          </a:p>
-        </p:txBody>
-      </p:sp>
+      <mc:AlternateContent xmlns:mc="http://schemas.openxmlformats.org/markup-compatibility/2006">
+        <mc:Choice xmlns:a14="http://schemas.microsoft.com/office/drawing/2010/main" Requires="a14">
+          <p:sp>
+            <p:nvSpPr>
+              <p:cNvPr id="7" name="TextBox 6">
+                <a:extLst>
+                  <a:ext uri="{FF2B5EF4-FFF2-40B4-BE49-F238E27FC236}">
+                    <a16:creationId xmlns:a16="http://schemas.microsoft.com/office/drawing/2014/main" id="{F36B6B47-55AD-B5E9-A7A2-7F9AD5FCAE08}"/>
+                  </a:ext>
+                </a:extLst>
+              </p:cNvPr>
+              <p:cNvSpPr txBox="1"/>
+              <p:nvPr/>
+            </p:nvSpPr>
+            <p:spPr>
+              <a:xfrm>
+                <a:off x="1386327" y="5008350"/>
+                <a:ext cx="10282687" cy="369332"/>
+              </a:xfrm>
+              <a:prstGeom prst="rect">
+                <a:avLst/>
+              </a:prstGeom>
+              <a:noFill/>
+            </p:spPr>
+            <p:txBody>
+              <a:bodyPr wrap="none" rtlCol="0">
+                <a:spAutoFit/>
+              </a:bodyPr>
+              <a:lstStyle/>
+              <a:p>
+                <a:pPr/>
+                <a14:m>
+                  <m:oMathPara xmlns:m="http://schemas.openxmlformats.org/officeDocument/2006/math">
+                    <m:oMathParaPr>
+                      <m:jc m:val="centerGroup"/>
+                    </m:oMathParaPr>
+                    <m:oMath xmlns:m="http://schemas.openxmlformats.org/officeDocument/2006/math">
+                      <m:sSub>
+                        <m:sSubPr>
+                          <m:ctrlPr>
+                            <a:rPr lang="pl-PL" i="1" smtClean="0">
+                              <a:latin typeface="Cambria Math" panose="02040503050406030204" pitchFamily="18" charset="0"/>
+                            </a:rPr>
+                          </m:ctrlPr>
+                        </m:sSubPr>
+                        <m:e>
+                          <m:r>
+                            <a:rPr lang="pl-PL" i="1">
+                              <a:latin typeface="Cambria Math" panose="02040503050406030204" pitchFamily="18" charset="0"/>
+                            </a:rPr>
+                            <m:t>𝑢𝑧</m:t>
+                          </m:r>
+                        </m:e>
+                        <m:sub>
+                          <m:r>
+                            <a:rPr lang="pl-PL" i="1">
+                              <a:latin typeface="Cambria Math" panose="02040503050406030204" pitchFamily="18" charset="0"/>
+                            </a:rPr>
+                            <m:t>2</m:t>
+                          </m:r>
+                        </m:sub>
+                      </m:sSub>
+                      <m:r>
+                        <a:rPr lang="pl-PL" i="1">
+                          <a:latin typeface="Cambria Math" panose="02040503050406030204" pitchFamily="18" charset="0"/>
+                        </a:rPr>
+                        <m:t> =</m:t>
+                      </m:r>
+                      <m:r>
+                        <a:rPr lang="en-US" b="0" i="1" smtClean="0">
+                          <a:latin typeface="Cambria Math" panose="02040503050406030204" pitchFamily="18" charset="0"/>
+                        </a:rPr>
+                        <m:t>3.85 </m:t>
+                      </m:r>
+                      <m:r>
+                        <a:rPr lang="en-US" b="0" i="1" smtClean="0">
+                          <a:solidFill>
+                            <a:srgbClr val="FF0000"/>
+                          </a:solidFill>
+                          <a:latin typeface="Cambria Math" panose="02040503050406030204" pitchFamily="18" charset="0"/>
+                        </a:rPr>
+                        <m:t># </m:t>
+                      </m:r>
+                      <m:r>
+                        <a:rPr lang="en-US" b="0" i="1" smtClean="0">
+                          <a:solidFill>
+                            <a:srgbClr val="FF0000"/>
+                          </a:solidFill>
+                          <a:latin typeface="Cambria Math" panose="02040503050406030204" pitchFamily="18" charset="0"/>
+                        </a:rPr>
+                        <m:t>𝑃𝑙𝑎𝑐𝑒h𝑜𝑙𝑑𝑒𝑟</m:t>
+                      </m:r>
+                      <m:r>
+                        <a:rPr lang="en-US" b="0" i="1" smtClean="0">
+                          <a:solidFill>
+                            <a:srgbClr val="FF0000"/>
+                          </a:solidFill>
+                          <a:latin typeface="Cambria Math" panose="02040503050406030204" pitchFamily="18" charset="0"/>
+                        </a:rPr>
+                        <m:t>, </m:t>
+                      </m:r>
+                      <m:r>
+                        <a:rPr lang="en-US" b="0" i="1" smtClean="0">
+                          <a:solidFill>
+                            <a:srgbClr val="FF0000"/>
+                          </a:solidFill>
+                          <a:latin typeface="Cambria Math" panose="02040503050406030204" pitchFamily="18" charset="0"/>
+                        </a:rPr>
+                        <m:t>𝑢𝑠𝑒</m:t>
+                      </m:r>
+                      <m:r>
+                        <a:rPr lang="en-US" b="0" i="1" smtClean="0">
+                          <a:solidFill>
+                            <a:srgbClr val="FF0000"/>
+                          </a:solidFill>
+                          <a:latin typeface="Cambria Math" panose="02040503050406030204" pitchFamily="18" charset="0"/>
+                        </a:rPr>
+                        <m:t> 10 </m:t>
+                      </m:r>
+                      <m:r>
+                        <a:rPr lang="en-US" b="0" i="1" smtClean="0">
+                          <a:solidFill>
+                            <a:srgbClr val="FF0000"/>
+                          </a:solidFill>
+                          <a:latin typeface="Cambria Math" panose="02040503050406030204" pitchFamily="18" charset="0"/>
+                        </a:rPr>
+                        <m:t>𝑚</m:t>
+                      </m:r>
+                      <m:r>
+                        <a:rPr lang="en-US" b="0" i="1" smtClean="0">
+                          <a:solidFill>
+                            <a:srgbClr val="FF0000"/>
+                          </a:solidFill>
+                          <a:latin typeface="Cambria Math" panose="02040503050406030204" pitchFamily="18" charset="0"/>
+                        </a:rPr>
+                        <m:t> </m:t>
+                      </m:r>
+                      <m:r>
+                        <a:rPr lang="en-US" b="0" i="1" smtClean="0">
+                          <a:solidFill>
+                            <a:srgbClr val="FF0000"/>
+                          </a:solidFill>
+                          <a:latin typeface="Cambria Math" panose="02040503050406030204" pitchFamily="18" charset="0"/>
+                        </a:rPr>
+                        <m:t>𝑤𝑖𝑛𝑑</m:t>
+                      </m:r>
+                      <m:r>
+                        <a:rPr lang="en-US" b="0" i="1" smtClean="0">
+                          <a:solidFill>
+                            <a:srgbClr val="FF0000"/>
+                          </a:solidFill>
+                          <a:latin typeface="Cambria Math" panose="02040503050406030204" pitchFamily="18" charset="0"/>
+                        </a:rPr>
+                        <m:t> </m:t>
+                      </m:r>
+                      <m:r>
+                        <a:rPr lang="en-US" b="0" i="1" smtClean="0">
+                          <a:solidFill>
+                            <a:srgbClr val="FF0000"/>
+                          </a:solidFill>
+                          <a:latin typeface="Cambria Math" panose="02040503050406030204" pitchFamily="18" charset="0"/>
+                        </a:rPr>
+                        <m:t>h𝑒𝑖𝑔h𝑡</m:t>
+                      </m:r>
+                      <m:r>
+                        <a:rPr lang="en-US" b="0" i="1" smtClean="0">
+                          <a:solidFill>
+                            <a:srgbClr val="FF0000"/>
+                          </a:solidFill>
+                          <a:latin typeface="Cambria Math" panose="02040503050406030204" pitchFamily="18" charset="0"/>
+                        </a:rPr>
+                        <m:t> </m:t>
+                      </m:r>
+                      <m:r>
+                        <a:rPr lang="en-US" b="0" i="1" smtClean="0">
+                          <a:solidFill>
+                            <a:srgbClr val="FF0000"/>
+                          </a:solidFill>
+                          <a:latin typeface="Cambria Math" panose="02040503050406030204" pitchFamily="18" charset="0"/>
+                        </a:rPr>
+                        <m:t>𝑓𝑜𝑟</m:t>
+                      </m:r>
+                      <m:r>
+                        <a:rPr lang="en-US" b="0" i="1" smtClean="0">
+                          <a:solidFill>
+                            <a:srgbClr val="FF0000"/>
+                          </a:solidFill>
+                          <a:latin typeface="Cambria Math" panose="02040503050406030204" pitchFamily="18" charset="0"/>
+                        </a:rPr>
+                        <m:t> </m:t>
+                      </m:r>
+                      <m:r>
+                        <a:rPr lang="en-US" b="0" i="1" smtClean="0">
+                          <a:solidFill>
+                            <a:srgbClr val="FF0000"/>
+                          </a:solidFill>
+                          <a:latin typeface="Cambria Math" panose="02040503050406030204" pitchFamily="18" charset="0"/>
+                        </a:rPr>
+                        <m:t>𝑝𝑢𝑟𝑝𝑜𝑠𝑒𝑠</m:t>
+                      </m:r>
+                      <m:r>
+                        <a:rPr lang="en-US" b="0" i="1" smtClean="0">
+                          <a:solidFill>
+                            <a:srgbClr val="FF0000"/>
+                          </a:solidFill>
+                          <a:latin typeface="Cambria Math" panose="02040503050406030204" pitchFamily="18" charset="0"/>
+                        </a:rPr>
+                        <m:t> </m:t>
+                      </m:r>
+                      <m:r>
+                        <a:rPr lang="en-US" b="0" i="1" smtClean="0">
+                          <a:solidFill>
+                            <a:srgbClr val="FF0000"/>
+                          </a:solidFill>
+                          <a:latin typeface="Cambria Math" panose="02040503050406030204" pitchFamily="18" charset="0"/>
+                        </a:rPr>
+                        <m:t>𝑜𝑓</m:t>
+                      </m:r>
+                      <m:r>
+                        <a:rPr lang="en-US" b="0" i="1" smtClean="0">
+                          <a:solidFill>
+                            <a:srgbClr val="FF0000"/>
+                          </a:solidFill>
+                          <a:latin typeface="Cambria Math" panose="02040503050406030204" pitchFamily="18" charset="0"/>
+                        </a:rPr>
+                        <m:t> </m:t>
+                      </m:r>
+                      <m:r>
+                        <a:rPr lang="en-US" b="0" i="1" smtClean="0">
+                          <a:solidFill>
+                            <a:srgbClr val="FF0000"/>
+                          </a:solidFill>
+                          <a:latin typeface="Cambria Math" panose="02040503050406030204" pitchFamily="18" charset="0"/>
+                        </a:rPr>
+                        <m:t>𝑟𝑒𝑚𝑎𝑖𝑛𝑖𝑛𝑔</m:t>
+                      </m:r>
+                      <m:r>
+                        <a:rPr lang="en-US" b="0" i="1" smtClean="0">
+                          <a:solidFill>
+                            <a:srgbClr val="FF0000"/>
+                          </a:solidFill>
+                          <a:latin typeface="Cambria Math" panose="02040503050406030204" pitchFamily="18" charset="0"/>
+                        </a:rPr>
+                        <m:t> </m:t>
+                      </m:r>
+                      <m:r>
+                        <a:rPr lang="en-US" b="0" i="1" smtClean="0">
+                          <a:solidFill>
+                            <a:srgbClr val="FF0000"/>
+                          </a:solidFill>
+                          <a:latin typeface="Cambria Math" panose="02040503050406030204" pitchFamily="18" charset="0"/>
+                        </a:rPr>
+                        <m:t>𝑐𝑎𝑙𝑐𝑢𝑙𝑎𝑡𝑖𝑜𝑛𝑠</m:t>
+                      </m:r>
+                      <m:r>
+                        <a:rPr lang="en-US" b="0" i="1" smtClean="0">
+                          <a:solidFill>
+                            <a:srgbClr val="FF0000"/>
+                          </a:solidFill>
+                          <a:latin typeface="Cambria Math" panose="02040503050406030204" pitchFamily="18" charset="0"/>
+                        </a:rPr>
+                        <m:t> </m:t>
+                      </m:r>
+                      <m:r>
+                        <a:rPr lang="en-US" b="0" i="1" smtClean="0">
+                          <a:solidFill>
+                            <a:srgbClr val="FF0000"/>
+                          </a:solidFill>
+                          <a:latin typeface="Cambria Math" panose="02040503050406030204" pitchFamily="18" charset="0"/>
+                        </a:rPr>
+                        <m:t>𝑓𝑜𝑟</m:t>
+                      </m:r>
+                      <m:r>
+                        <a:rPr lang="en-US" b="0" i="1" smtClean="0">
+                          <a:solidFill>
+                            <a:srgbClr val="FF0000"/>
+                          </a:solidFill>
+                          <a:latin typeface="Cambria Math" panose="02040503050406030204" pitchFamily="18" charset="0"/>
+                        </a:rPr>
+                        <m:t> </m:t>
+                      </m:r>
+                      <m:r>
+                        <a:rPr lang="en-US" b="0" i="1" smtClean="0">
+                          <a:solidFill>
+                            <a:srgbClr val="FF0000"/>
+                          </a:solidFill>
+                          <a:latin typeface="Cambria Math" panose="02040503050406030204" pitchFamily="18" charset="0"/>
+                        </a:rPr>
+                        <m:t>𝑛𝑜𝑤</m:t>
+                      </m:r>
+                    </m:oMath>
+                  </m:oMathPara>
+                </a14:m>
+                <a:endParaRPr lang="en-US" dirty="0"/>
+              </a:p>
+            </p:txBody>
+          </p:sp>
+        </mc:Choice>
+        <mc:Fallback>
+          <p:sp>
+            <p:nvSpPr>
+              <p:cNvPr id="7" name="TextBox 6">
+                <a:extLst>
+                  <a:ext uri="{FF2B5EF4-FFF2-40B4-BE49-F238E27FC236}">
+                    <a16:creationId xmlns:a16="http://schemas.microsoft.com/office/drawing/2014/main" id="{F36B6B47-55AD-B5E9-A7A2-7F9AD5FCAE08}"/>
+                  </a:ext>
+                </a:extLst>
+              </p:cNvPr>
+              <p:cNvSpPr txBox="1">
+                <a:spLocks noRot="1" noChangeAspect="1" noMove="1" noResize="1" noEditPoints="1" noAdjustHandles="1" noChangeArrowheads="1" noChangeShapeType="1" noTextEdit="1"/>
+              </p:cNvSpPr>
+              <p:nvPr/>
+            </p:nvSpPr>
+            <p:spPr>
+              <a:xfrm>
+                <a:off x="1386327" y="5008350"/>
+                <a:ext cx="10282687" cy="369332"/>
+              </a:xfrm>
+              <a:prstGeom prst="rect">
+                <a:avLst/>
+              </a:prstGeom>
+              <a:blipFill>
+                <a:blip r:embed="rId5"/>
+                <a:stretch>
+                  <a:fillRect b="-13333"/>
+                </a:stretch>
+              </a:blipFill>
+            </p:spPr>
+            <p:txBody>
+              <a:bodyPr/>
+              <a:lstStyle/>
+              <a:p>
+                <a:r>
+                  <a:rPr lang="en-US">
+                    <a:noFill/>
+                  </a:rPr>
+                  <a:t> </a:t>
+                </a:r>
+              </a:p>
+            </p:txBody>
+          </p:sp>
+        </mc:Fallback>
+      </mc:AlternateContent>
     </p:spTree>
     <p:extLst>
       <p:ext uri="{BB962C8B-B14F-4D97-AF65-F5344CB8AC3E}">
@@ -7038,7 +7047,7 @@
 </p:sld>
 </file>
 
-<file path=ppt/slides/slide19.xml><?xml version="1.0" encoding="utf-8"?>
+<file path=ppt/slides/slide18.xml><?xml version="1.0" encoding="utf-8"?>
 <p:sld xmlns:a="http://schemas.openxmlformats.org/drawingml/2006/main" xmlns:r="http://schemas.openxmlformats.org/officeDocument/2006/relationships" xmlns:p="http://schemas.openxmlformats.org/presentationml/2006/main">
   <p:cSld>
     <p:spTree>
@@ -7055,8 +7064,8 @@
           <a:chExt cx="0" cy="0"/>
         </a:xfrm>
       </p:grpSpPr>
-      <mc:AlternateContent xmlns:mc="http://schemas.openxmlformats.org/markup-compatibility/2006">
-        <mc:Choice xmlns:a14="http://schemas.microsoft.com/office/drawing/2010/main" Requires="a14">
+      <mc:AlternateContent xmlns:mc="http://schemas.openxmlformats.org/markup-compatibility/2006" xmlns:a14="http://schemas.microsoft.com/office/drawing/2010/main">
+        <mc:Choice Requires="a14">
           <p:sp>
             <p:nvSpPr>
               <p:cNvPr id="4" name="TextBox 3">
@@ -7085,6 +7094,7 @@
               </a:bodyPr>
               <a:lstStyle/>
               <a:p>
+                <a:pPr/>
                 <a14:m>
                   <m:oMathPara xmlns:m="http://schemas.openxmlformats.org/officeDocument/2006/math">
                     <m:oMathParaPr>
@@ -7313,7 +7323,7 @@
             </p:txBody>
           </p:sp>
         </mc:Choice>
-        <mc:Fallback>
+        <mc:Fallback xmlns="">
           <p:sp>
             <p:nvSpPr>
               <p:cNvPr id="4" name="TextBox 3">
@@ -7358,8 +7368,8 @@
           </p:sp>
         </mc:Fallback>
       </mc:AlternateContent>
-      <mc:AlternateContent xmlns:mc="http://schemas.openxmlformats.org/markup-compatibility/2006">
-        <mc:Choice xmlns:a14="http://schemas.microsoft.com/office/drawing/2010/main" Requires="a14">
+      <mc:AlternateContent xmlns:mc="http://schemas.openxmlformats.org/markup-compatibility/2006" xmlns:a14="http://schemas.microsoft.com/office/drawing/2010/main">
+        <mc:Choice Requires="a14">
           <p:sp>
             <p:nvSpPr>
               <p:cNvPr id="5" name="TextBox 4">
@@ -7388,6 +7398,7 @@
               </a:bodyPr>
               <a:lstStyle/>
               <a:p>
+                <a:pPr/>
                 <a14:m>
                   <m:oMathPara xmlns:m="http://schemas.openxmlformats.org/officeDocument/2006/math">
                     <m:oMathParaPr>
@@ -7616,7 +7627,7 @@
             </p:txBody>
           </p:sp>
         </mc:Choice>
-        <mc:Fallback>
+        <mc:Fallback xmlns="">
           <p:sp>
             <p:nvSpPr>
               <p:cNvPr id="5" name="TextBox 4">
@@ -7661,8 +7672,8 @@
           </p:sp>
         </mc:Fallback>
       </mc:AlternateContent>
-      <mc:AlternateContent xmlns:mc="http://schemas.openxmlformats.org/markup-compatibility/2006">
-        <mc:Choice xmlns:a14="http://schemas.microsoft.com/office/drawing/2010/main" Requires="a14">
+      <mc:AlternateContent xmlns:mc="http://schemas.openxmlformats.org/markup-compatibility/2006" xmlns:a14="http://schemas.microsoft.com/office/drawing/2010/main">
+        <mc:Choice Requires="a14">
           <p:sp>
             <p:nvSpPr>
               <p:cNvPr id="6" name="TextBox 5">
@@ -7691,6 +7702,7 @@
               </a:bodyPr>
               <a:lstStyle/>
               <a:p>
+                <a:pPr/>
                 <a14:m>
                   <m:oMathPara xmlns:m="http://schemas.openxmlformats.org/officeDocument/2006/math">
                     <m:oMathParaPr>
@@ -7747,13 +7759,7 @@
                             <a:rPr lang="en-US" b="0" i="1" smtClean="0">
                               <a:latin typeface="Cambria Math" panose="02040503050406030204" pitchFamily="18" charset="0"/>
                             </a:rPr>
-                            <m:t>0.</m:t>
-                          </m:r>
-                          <m:r>
-                            <a:rPr lang="en-US" b="0" i="1" smtClean="0">
-                              <a:latin typeface="Cambria Math" panose="02040503050406030204" pitchFamily="18" charset="0"/>
-                            </a:rPr>
-                            <m:t>34405</m:t>
+                            <m:t>0.34405</m:t>
                           </m:r>
                         </m:num>
                         <m:den>
@@ -7885,7 +7891,7 @@
             </p:txBody>
           </p:sp>
         </mc:Choice>
-        <mc:Fallback>
+        <mc:Fallback xmlns="">
           <p:sp>
             <p:nvSpPr>
               <p:cNvPr id="6" name="TextBox 5">
@@ -7930,8 +7936,8 @@
           </p:sp>
         </mc:Fallback>
       </mc:AlternateContent>
-      <mc:AlternateContent xmlns:mc="http://schemas.openxmlformats.org/markup-compatibility/2006">
-        <mc:Choice xmlns:a14="http://schemas.microsoft.com/office/drawing/2010/main" Requires="a14">
+      <mc:AlternateContent xmlns:mc="http://schemas.openxmlformats.org/markup-compatibility/2006" xmlns:a14="http://schemas.microsoft.com/office/drawing/2010/main">
+        <mc:Choice Requires="a14">
           <p:sp>
             <p:nvSpPr>
               <p:cNvPr id="8" name="TextBox 7">
@@ -7960,6 +7966,7 @@
               </a:bodyPr>
               <a:lstStyle/>
               <a:p>
+                <a:pPr/>
                 <a14:m>
                   <m:oMathPara xmlns:m="http://schemas.openxmlformats.org/officeDocument/2006/math">
                     <m:oMathParaPr>
@@ -8117,7 +8124,7 @@
             </p:txBody>
           </p:sp>
         </mc:Choice>
-        <mc:Fallback>
+        <mc:Fallback xmlns="">
           <p:sp>
             <p:nvSpPr>
               <p:cNvPr id="8" name="TextBox 7">
@@ -8231,6 +8238,89 @@
     <p:extLst>
       <p:ext uri="{BB962C8B-B14F-4D97-AF65-F5344CB8AC3E}">
         <p14:creationId xmlns:p14="http://schemas.microsoft.com/office/powerpoint/2010/main" val="3698457217"/>
+      </p:ext>
+    </p:extLst>
+  </p:cSld>
+  <p:clrMapOvr>
+    <a:masterClrMapping/>
+  </p:clrMapOvr>
+</p:sld>
+</file>
+
+<file path=ppt/slides/slide19.xml><?xml version="1.0" encoding="utf-8"?>
+<p:sld xmlns:a="http://schemas.openxmlformats.org/drawingml/2006/main" xmlns:r="http://schemas.openxmlformats.org/officeDocument/2006/relationships" xmlns:p="http://schemas.openxmlformats.org/presentationml/2006/main">
+  <p:cSld>
+    <p:spTree>
+      <p:nvGrpSpPr>
+        <p:cNvPr id="1" name=""/>
+        <p:cNvGrpSpPr/>
+        <p:nvPr/>
+      </p:nvGrpSpPr>
+      <p:grpSpPr>
+        <a:xfrm>
+          <a:off x="0" y="0"/>
+          <a:ext cx="0" cy="0"/>
+          <a:chOff x="0" y="0"/>
+          <a:chExt cx="0" cy="0"/>
+        </a:xfrm>
+      </p:grpSpPr>
+      <p:sp>
+        <p:nvSpPr>
+          <p:cNvPr id="2" name="Title 1">
+            <a:extLst>
+              <a:ext uri="{FF2B5EF4-FFF2-40B4-BE49-F238E27FC236}">
+                <a16:creationId xmlns:a16="http://schemas.microsoft.com/office/drawing/2014/main" id="{5CF574DF-3DF9-825F-3566-44C4556923AC}"/>
+              </a:ext>
+            </a:extLst>
+          </p:cNvPr>
+          <p:cNvSpPr>
+            <a:spLocks noGrp="1"/>
+          </p:cNvSpPr>
+          <p:nvPr>
+            <p:ph type="title"/>
+          </p:nvPr>
+        </p:nvSpPr>
+        <p:spPr/>
+        <p:txBody>
+          <a:bodyPr/>
+          <a:lstStyle/>
+          <a:p>
+            <a:r>
+              <a:rPr lang="en-US" dirty="0"/>
+              <a:t>Part 3</a:t>
+            </a:r>
+          </a:p>
+        </p:txBody>
+      </p:sp>
+      <p:sp>
+        <p:nvSpPr>
+          <p:cNvPr id="3" name="Content Placeholder 2">
+            <a:extLst>
+              <a:ext uri="{FF2B5EF4-FFF2-40B4-BE49-F238E27FC236}">
+                <a16:creationId xmlns:a16="http://schemas.microsoft.com/office/drawing/2014/main" id="{A66A946F-F501-4652-7C2C-3E24F27B2E06}"/>
+              </a:ext>
+            </a:extLst>
+          </p:cNvPr>
+          <p:cNvSpPr>
+            <a:spLocks noGrp="1"/>
+          </p:cNvSpPr>
+          <p:nvPr>
+            <p:ph idx="1"/>
+          </p:nvPr>
+        </p:nvSpPr>
+        <p:spPr/>
+        <p:txBody>
+          <a:bodyPr/>
+          <a:lstStyle/>
+          <a:p>
+            <a:endParaRPr lang="en-US"/>
+          </a:p>
+        </p:txBody>
+      </p:sp>
+    </p:spTree>
+    <p:extLst>
+      <p:ext uri="{BB962C8B-B14F-4D97-AF65-F5344CB8AC3E}">
+        <p14:creationId xmlns:p14="http://schemas.microsoft.com/office/powerpoint/2010/main" val="103419915"/>
       </p:ext>
     </p:extLst>
   </p:cSld>
@@ -8360,7 +8450,7 @@
           <p:cNvPr id="2" name="Title 1">
             <a:extLst>
               <a:ext uri="{FF2B5EF4-FFF2-40B4-BE49-F238E27FC236}">
-                <a16:creationId xmlns:a16="http://schemas.microsoft.com/office/drawing/2014/main" id="{7C9CFCF0-2887-EB8C-1B98-52D1716993A2}"/>
+                <a16:creationId xmlns:a16="http://schemas.microsoft.com/office/drawing/2014/main" id="{E91A0E6B-6219-1764-73F9-F5C151208015}"/>
               </a:ext>
             </a:extLst>
           </p:cNvPr>
@@ -8380,215 +8470,8 @@
           </a:p>
         </p:txBody>
       </p:sp>
-      <p:sp>
-        <p:nvSpPr>
-          <p:cNvPr id="3" name="Content Placeholder 2">
-            <a:extLst>
-              <a:ext uri="{FF2B5EF4-FFF2-40B4-BE49-F238E27FC236}">
-                <a16:creationId xmlns:a16="http://schemas.microsoft.com/office/drawing/2014/main" id="{217145F7-01F9-4B7E-ED8B-738FAC5585F0}"/>
-              </a:ext>
-            </a:extLst>
-          </p:cNvPr>
-          <p:cNvSpPr>
-            <a:spLocks noGrp="1"/>
-          </p:cNvSpPr>
-          <p:nvPr>
-            <p:ph idx="1"/>
-          </p:nvPr>
-        </p:nvSpPr>
-        <p:spPr/>
-        <p:txBody>
-          <a:bodyPr/>
-          <a:lstStyle/>
-          <a:p>
-            <a:r>
-              <a:rPr lang="en-US" dirty="0"/>
-              <a:t>Is 2 m height correct? Does the height for cloud water interception need to be adjusted based on vegetation canopy height?</a:t>
-            </a:r>
-          </a:p>
-          <a:p>
-            <a:r>
-              <a:rPr lang="en-US" dirty="0"/>
-              <a:t>Tree height can be 30 m in Hawaii</a:t>
-            </a:r>
-          </a:p>
-        </p:txBody>
-      </p:sp>
-      <p:sp>
-        <p:nvSpPr>
-          <p:cNvPr id="4" name="TextBox 3">
-            <a:extLst>
-              <a:ext uri="{FF2B5EF4-FFF2-40B4-BE49-F238E27FC236}">
-                <a16:creationId xmlns:a16="http://schemas.microsoft.com/office/drawing/2014/main" id="{91C165BF-AD89-2B51-B54C-EEB9740E2886}"/>
-              </a:ext>
-            </a:extLst>
-          </p:cNvPr>
-          <p:cNvSpPr txBox="1"/>
-          <p:nvPr/>
-        </p:nvSpPr>
-        <p:spPr>
-          <a:xfrm>
-            <a:off x="914400" y="3063785"/>
-            <a:ext cx="10213848" cy="1200329"/>
-          </a:xfrm>
-          <a:prstGeom prst="rect">
-            <a:avLst/>
-          </a:prstGeom>
-          <a:noFill/>
-        </p:spPr>
-        <p:txBody>
-          <a:bodyPr wrap="square" rtlCol="0">
-            <a:spAutoFit/>
-          </a:bodyPr>
-          <a:lstStyle/>
-          <a:p>
-            <a:r>
-              <a:rPr lang="en-US" dirty="0"/>
-              <a:t>https://www.google.com/url?sa=t&amp;rct=j&amp;q=&amp;esrc=s&amp;source=web&amp;cd=&amp;ved=2ahUKEwjm-sbRyJKCAxUtFzQIHaDNBEcQFnoECBEQAw&amp;url=https%3A%2F%2Fwww.ctahr.hawaii.edu%2Fgsp%2Fdoc%2FForestry%2FLittle_Skolmen_CFT%2FCFT_Acacia_koa.pdf&amp;usg=AOvVaw2Td9d_est5q_LfzyyAB6XO&amp;opi=89978449</a:t>
-            </a:r>
-          </a:p>
-        </p:txBody>
-      </p:sp>
-    </p:spTree>
-    <p:extLst>
-      <p:ext uri="{BB962C8B-B14F-4D97-AF65-F5344CB8AC3E}">
-        <p14:creationId xmlns:p14="http://schemas.microsoft.com/office/powerpoint/2010/main" val="2597700373"/>
-      </p:ext>
-    </p:extLst>
-  </p:cSld>
-  <p:clrMapOvr>
-    <a:masterClrMapping/>
-  </p:clrMapOvr>
-</p:sld>
-</file>
-
-<file path=ppt/slides/slide21.xml><?xml version="1.0" encoding="utf-8"?>
-<p:sld xmlns:a="http://schemas.openxmlformats.org/drawingml/2006/main" xmlns:r="http://schemas.openxmlformats.org/officeDocument/2006/relationships" xmlns:p="http://schemas.openxmlformats.org/presentationml/2006/main">
-  <p:cSld>
-    <p:spTree>
-      <p:nvGrpSpPr>
-        <p:cNvPr id="1" name=""/>
-        <p:cNvGrpSpPr/>
-        <p:nvPr/>
-      </p:nvGrpSpPr>
-      <p:grpSpPr>
-        <a:xfrm>
-          <a:off x="0" y="0"/>
-          <a:ext cx="0" cy="0"/>
-          <a:chOff x="0" y="0"/>
-          <a:chExt cx="0" cy="0"/>
-        </a:xfrm>
-      </p:grpSpPr>
-      <p:sp>
-        <p:nvSpPr>
-          <p:cNvPr id="2" name="Title 1">
-            <a:extLst>
-              <a:ext uri="{FF2B5EF4-FFF2-40B4-BE49-F238E27FC236}">
-                <a16:creationId xmlns:a16="http://schemas.microsoft.com/office/drawing/2014/main" id="{5CF574DF-3DF9-825F-3566-44C4556923AC}"/>
-              </a:ext>
-            </a:extLst>
-          </p:cNvPr>
-          <p:cNvSpPr>
-            <a:spLocks noGrp="1"/>
-          </p:cNvSpPr>
-          <p:nvPr>
-            <p:ph type="title"/>
-          </p:nvPr>
-        </p:nvSpPr>
-        <p:spPr/>
-        <p:txBody>
-          <a:bodyPr/>
-          <a:lstStyle/>
-          <a:p>
-            <a:r>
-              <a:rPr lang="en-US" dirty="0"/>
-              <a:t>Part 3</a:t>
-            </a:r>
-          </a:p>
-        </p:txBody>
-      </p:sp>
-      <p:sp>
-        <p:nvSpPr>
-          <p:cNvPr id="3" name="Content Placeholder 2">
-            <a:extLst>
-              <a:ext uri="{FF2B5EF4-FFF2-40B4-BE49-F238E27FC236}">
-                <a16:creationId xmlns:a16="http://schemas.microsoft.com/office/drawing/2014/main" id="{A66A946F-F501-4652-7C2C-3E24F27B2E06}"/>
-              </a:ext>
-            </a:extLst>
-          </p:cNvPr>
-          <p:cNvSpPr>
-            <a:spLocks noGrp="1"/>
-          </p:cNvSpPr>
-          <p:nvPr>
-            <p:ph idx="1"/>
-          </p:nvPr>
-        </p:nvSpPr>
-        <p:spPr/>
-        <p:txBody>
-          <a:bodyPr/>
-          <a:lstStyle/>
-          <a:p>
-            <a:endParaRPr lang="en-US"/>
-          </a:p>
-        </p:txBody>
-      </p:sp>
-    </p:spTree>
-    <p:extLst>
-      <p:ext uri="{BB962C8B-B14F-4D97-AF65-F5344CB8AC3E}">
-        <p14:creationId xmlns:p14="http://schemas.microsoft.com/office/powerpoint/2010/main" val="103419915"/>
-      </p:ext>
-    </p:extLst>
-  </p:cSld>
-  <p:clrMapOvr>
-    <a:masterClrMapping/>
-  </p:clrMapOvr>
-</p:sld>
-</file>
-
-<file path=ppt/slides/slide22.xml><?xml version="1.0" encoding="utf-8"?>
-<p:sld xmlns:a="http://schemas.openxmlformats.org/drawingml/2006/main" xmlns:r="http://schemas.openxmlformats.org/officeDocument/2006/relationships" xmlns:p="http://schemas.openxmlformats.org/presentationml/2006/main">
-  <p:cSld>
-    <p:spTree>
-      <p:nvGrpSpPr>
-        <p:cNvPr id="1" name=""/>
-        <p:cNvGrpSpPr/>
-        <p:nvPr/>
-      </p:nvGrpSpPr>
-      <p:grpSpPr>
-        <a:xfrm>
-          <a:off x="0" y="0"/>
-          <a:ext cx="0" cy="0"/>
-          <a:chOff x="0" y="0"/>
-          <a:chExt cx="0" cy="0"/>
-        </a:xfrm>
-      </p:grpSpPr>
-      <p:sp>
-        <p:nvSpPr>
-          <p:cNvPr id="2" name="Title 1">
-            <a:extLst>
-              <a:ext uri="{FF2B5EF4-FFF2-40B4-BE49-F238E27FC236}">
-                <a16:creationId xmlns:a16="http://schemas.microsoft.com/office/drawing/2014/main" id="{E91A0E6B-6219-1764-73F9-F5C151208015}"/>
-              </a:ext>
-            </a:extLst>
-          </p:cNvPr>
-          <p:cNvSpPr>
-            <a:spLocks noGrp="1"/>
-          </p:cNvSpPr>
-          <p:nvPr>
-            <p:ph type="title"/>
-          </p:nvPr>
-        </p:nvSpPr>
-        <p:spPr/>
-        <p:txBody>
-          <a:bodyPr/>
-          <a:lstStyle/>
-          <a:p>
-            <a:endParaRPr lang="en-US"/>
-          </a:p>
-        </p:txBody>
-      </p:sp>
-      <mc:AlternateContent xmlns:mc="http://schemas.openxmlformats.org/markup-compatibility/2006">
-        <mc:Choice xmlns:a14="http://schemas.microsoft.com/office/drawing/2010/main" Requires="a14">
+      <mc:AlternateContent xmlns:mc="http://schemas.openxmlformats.org/markup-compatibility/2006" xmlns:a14="http://schemas.microsoft.com/office/drawing/2010/main">
+        <mc:Choice Requires="a14">
           <p:sp>
             <p:nvSpPr>
               <p:cNvPr id="4" name="TextBox 3">
@@ -8617,6 +8500,7 @@
               </a:bodyPr>
               <a:lstStyle/>
               <a:p>
+                <a:pPr/>
                 <a14:m>
                   <m:oMathPara xmlns:m="http://schemas.openxmlformats.org/officeDocument/2006/math">
                     <m:oMathParaPr>
@@ -8668,7 +8552,7 @@
             </p:txBody>
           </p:sp>
         </mc:Choice>
-        <mc:Fallback>
+        <mc:Fallback xmlns="">
           <p:sp>
             <p:nvSpPr>
               <p:cNvPr id="4" name="TextBox 3">
@@ -8713,8 +8597,8 @@
           </p:sp>
         </mc:Fallback>
       </mc:AlternateContent>
-      <mc:AlternateContent xmlns:mc="http://schemas.openxmlformats.org/markup-compatibility/2006">
-        <mc:Choice xmlns:a14="http://schemas.microsoft.com/office/drawing/2010/main" Requires="a14">
+      <mc:AlternateContent xmlns:mc="http://schemas.openxmlformats.org/markup-compatibility/2006" xmlns:a14="http://schemas.microsoft.com/office/drawing/2010/main">
+        <mc:Choice Requires="a14">
           <p:sp>
             <p:nvSpPr>
               <p:cNvPr id="5" name="TextBox 4">
@@ -8743,6 +8627,7 @@
               </a:bodyPr>
               <a:lstStyle/>
               <a:p>
+                <a:pPr/>
                 <a14:m>
                   <m:oMathPara xmlns:m="http://schemas.openxmlformats.org/officeDocument/2006/math">
                     <m:oMathParaPr>
@@ -8806,7 +8691,7 @@
             </p:txBody>
           </p:sp>
         </mc:Choice>
-        <mc:Fallback>
+        <mc:Fallback xmlns="">
           <p:sp>
             <p:nvSpPr>
               <p:cNvPr id="5" name="TextBox 4">
@@ -8881,6 +8766,7 @@
               </a:bodyPr>
               <a:lstStyle/>
               <a:p>
+                <a:pPr/>
                 <a14:m>
                   <m:oMathPara xmlns:m="http://schemas.openxmlformats.org/officeDocument/2006/math">
                     <m:oMathParaPr>
@@ -8920,7 +8806,7 @@
                             <a:rPr lang="en-US" b="0" i="1" smtClean="0">
                               <a:latin typeface="Cambria Math" panose="02040503050406030204" pitchFamily="18" charset="0"/>
                             </a:rPr>
-                            <m:t>1</m:t>
+                            <m:t>35</m:t>
                           </m:r>
                         </m:den>
                       </m:f>
@@ -8994,7 +8880,7 @@
             <p:spPr>
               <a:xfrm>
                 <a:off x="838200" y="2798143"/>
-                <a:ext cx="2748125" cy="280077"/>
+                <a:ext cx="2876365" cy="280077"/>
               </a:xfrm>
               <a:prstGeom prst="rect">
                 <a:avLst/>
@@ -9007,6 +8893,7 @@
               </a:bodyPr>
               <a:lstStyle/>
               <a:p>
+                <a:pPr/>
                 <a14:m>
                   <m:oMathPara xmlns:m="http://schemas.openxmlformats.org/officeDocument/2006/math">
                     <m:oMathParaPr>
@@ -9038,7 +8925,7 @@
                             <a:rPr lang="en-US" b="0" i="1" smtClean="0">
                               <a:latin typeface="Cambria Math" panose="02040503050406030204" pitchFamily="18" charset="0"/>
                             </a:rPr>
-                            <m:t>5.919342</m:t>
+                            <m:t>0.1691240</m:t>
                           </m:r>
                         </m:e>
                         <m:sup>
@@ -9076,7 +8963,7 @@
             <p:spPr>
               <a:xfrm>
                 <a:off x="838200" y="2798143"/>
-                <a:ext cx="2748125" cy="280077"/>
+                <a:ext cx="2876365" cy="280077"/>
               </a:xfrm>
               <a:prstGeom prst="rect">
                 <a:avLst/>
@@ -9084,7 +8971,7 @@
               <a:blipFill>
                 <a:blip r:embed="rId5"/>
                 <a:stretch>
-                  <a:fillRect l="-2000" t="-2174" r="-889" b="-10870"/>
+                  <a:fillRect l="-1911" t="-2174" r="-849" b="-10870"/>
                 </a:stretch>
               </a:blipFill>
             </p:spPr>
@@ -9120,7 +9007,7 @@
             <p:spPr>
               <a:xfrm>
                 <a:off x="827991" y="3421490"/>
-                <a:ext cx="1815241" cy="270652"/>
+                <a:ext cx="1687000" cy="270652"/>
               </a:xfrm>
               <a:prstGeom prst="rect">
                 <a:avLst/>
@@ -9133,6 +9020,7 @@
               </a:bodyPr>
               <a:lstStyle/>
               <a:p>
+                <a:pPr/>
                 <a14:m>
                   <m:oMathPara xmlns:m="http://schemas.openxmlformats.org/officeDocument/2006/math">
                     <m:oMathParaPr>
@@ -9149,7 +9037,7 @@
                         <a:rPr lang="en-US" b="0" i="1" smtClean="0">
                           <a:latin typeface="Cambria Math" panose="02040503050406030204" pitchFamily="18" charset="0"/>
                         </a:rPr>
-                        <m:t>=0.006740733</m:t>
+                        <m:t>=0.03987872</m:t>
                       </m:r>
                     </m:oMath>
                   </m:oMathPara>
@@ -9177,7 +9065,7 @@
             <p:spPr>
               <a:xfrm>
                 <a:off x="827991" y="3421490"/>
-                <a:ext cx="1815241" cy="270652"/>
+                <a:ext cx="1687000" cy="270652"/>
               </a:xfrm>
               <a:prstGeom prst="rect">
                 <a:avLst/>
@@ -9185,7 +9073,7 @@
               <a:blipFill>
                 <a:blip r:embed="rId6"/>
                 <a:stretch>
-                  <a:fillRect l="-3356" r="-3020" b="-11111"/>
+                  <a:fillRect l="-3610" r="-3249" b="-11111"/>
                 </a:stretch>
               </a:blipFill>
             </p:spPr>
@@ -9204,8 +9092,8 @@
           </p:sp>
         </mc:Fallback>
       </mc:AlternateContent>
-      <mc:AlternateContent xmlns:mc="http://schemas.openxmlformats.org/markup-compatibility/2006">
-        <mc:Choice xmlns:a14="http://schemas.microsoft.com/office/drawing/2010/main" Requires="a14">
+      <mc:AlternateContent xmlns:mc="http://schemas.openxmlformats.org/markup-compatibility/2006" xmlns:a14="http://schemas.microsoft.com/office/drawing/2010/main">
+        <mc:Choice Requires="a14">
           <p:sp>
             <p:nvSpPr>
               <p:cNvPr id="9" name="TextBox 8">
@@ -9234,6 +9122,7 @@
               </a:bodyPr>
               <a:lstStyle/>
               <a:p>
+                <a:pPr/>
                 <a14:m>
                   <m:oMathPara xmlns:m="http://schemas.openxmlformats.org/officeDocument/2006/math">
                     <m:oMathParaPr>
@@ -9302,7 +9191,7 @@
             </p:txBody>
           </p:sp>
         </mc:Choice>
-        <mc:Fallback>
+        <mc:Fallback xmlns="">
           <p:sp>
             <p:nvSpPr>
               <p:cNvPr id="9" name="TextBox 8">
@@ -9364,7 +9253,7 @@
             <p:spPr>
               <a:xfrm>
                 <a:off x="838200" y="4592785"/>
-                <a:ext cx="2947217" cy="270652"/>
+                <a:ext cx="2818977" cy="270652"/>
               </a:xfrm>
               <a:prstGeom prst="rect">
                 <a:avLst/>
@@ -9377,6 +9266,7 @@
               </a:bodyPr>
               <a:lstStyle/>
               <a:p>
+                <a:pPr/>
                 <a14:m>
                   <m:oMathPara xmlns:m="http://schemas.openxmlformats.org/officeDocument/2006/math">
                     <m:oMathParaPr>
@@ -9393,7 +9283,7 @@
                         <a:rPr lang="en-US" b="0" i="1" smtClean="0">
                           <a:latin typeface="Cambria Math" panose="02040503050406030204" pitchFamily="18" charset="0"/>
                         </a:rPr>
-                        <m:t>=0.006740733 ∗4.755</m:t>
+                        <m:t>=0.03987872 ∗4.755</m:t>
                       </m:r>
                     </m:oMath>
                   </m:oMathPara>
@@ -9421,7 +9311,7 @@
             <p:spPr>
               <a:xfrm>
                 <a:off x="838200" y="4592785"/>
-                <a:ext cx="2947217" cy="270652"/>
+                <a:ext cx="2818977" cy="270652"/>
               </a:xfrm>
               <a:prstGeom prst="rect">
                 <a:avLst/>
@@ -9429,7 +9319,7 @@
               <a:blipFill>
                 <a:blip r:embed="rId8"/>
                 <a:stretch>
-                  <a:fillRect l="-1863" r="-1863" b="-11111"/>
+                  <a:fillRect l="-1948" r="-1948" b="-11111"/>
                 </a:stretch>
               </a:blipFill>
             </p:spPr>
@@ -9465,7 +9355,7 @@
             <p:spPr>
               <a:xfrm>
                 <a:off x="861396" y="5027175"/>
-                <a:ext cx="1735347" cy="270652"/>
+                <a:ext cx="1991827" cy="270652"/>
               </a:xfrm>
               <a:prstGeom prst="rect">
                 <a:avLst/>
@@ -9478,6 +9368,7 @@
               </a:bodyPr>
               <a:lstStyle/>
               <a:p>
+                <a:pPr/>
                 <a14:m>
                   <m:oMathPara xmlns:m="http://schemas.openxmlformats.org/officeDocument/2006/math">
                     <m:oMathParaPr>
@@ -9494,7 +9385,7 @@
                         <a:rPr lang="en-US" b="0" i="1" smtClean="0">
                           <a:latin typeface="Cambria Math" panose="02040503050406030204" pitchFamily="18" charset="0"/>
                         </a:rPr>
-                        <m:t>=0.032055</m:t>
+                        <m:t>=0.18964002</m:t>
                       </m:r>
                     </m:oMath>
                   </m:oMathPara>
@@ -9522,7 +9413,7 @@
             <p:spPr>
               <a:xfrm>
                 <a:off x="861396" y="5027175"/>
-                <a:ext cx="1735347" cy="270652"/>
+                <a:ext cx="1991827" cy="270652"/>
               </a:xfrm>
               <a:prstGeom prst="rect">
                 <a:avLst/>
@@ -9530,7 +9421,7 @@
               <a:blipFill>
                 <a:blip r:embed="rId9"/>
                 <a:stretch>
-                  <a:fillRect l="-3158" r="-3509" b="-13636"/>
+                  <a:fillRect l="-2752" r="-3058" b="-11364"/>
                 </a:stretch>
               </a:blipFill>
             </p:spPr>
@@ -9553,6 +9444,125 @@
     <p:extLst>
       <p:ext uri="{BB962C8B-B14F-4D97-AF65-F5344CB8AC3E}">
         <p14:creationId xmlns:p14="http://schemas.microsoft.com/office/powerpoint/2010/main" val="3129093143"/>
+      </p:ext>
+    </p:extLst>
+  </p:cSld>
+  <p:clrMapOvr>
+    <a:masterClrMapping/>
+  </p:clrMapOvr>
+</p:sld>
+</file>
+
+<file path=ppt/slides/slide21.xml><?xml version="1.0" encoding="utf-8"?>
+<p:sld xmlns:a="http://schemas.openxmlformats.org/drawingml/2006/main" xmlns:r="http://schemas.openxmlformats.org/officeDocument/2006/relationships" xmlns:p="http://schemas.openxmlformats.org/presentationml/2006/main">
+  <p:cSld>
+    <p:spTree>
+      <p:nvGrpSpPr>
+        <p:cNvPr id="1" name=""/>
+        <p:cNvGrpSpPr/>
+        <p:nvPr/>
+      </p:nvGrpSpPr>
+      <p:grpSpPr>
+        <a:xfrm>
+          <a:off x="0" y="0"/>
+          <a:ext cx="0" cy="0"/>
+          <a:chOff x="0" y="0"/>
+          <a:chExt cx="0" cy="0"/>
+        </a:xfrm>
+      </p:grpSpPr>
+      <p:sp>
+        <p:nvSpPr>
+          <p:cNvPr id="2" name="Title 1">
+            <a:extLst>
+              <a:ext uri="{FF2B5EF4-FFF2-40B4-BE49-F238E27FC236}">
+                <a16:creationId xmlns:a16="http://schemas.microsoft.com/office/drawing/2014/main" id="{383BA06A-4B7C-43A5-CEBA-FF4457028B40}"/>
+              </a:ext>
+            </a:extLst>
+          </p:cNvPr>
+          <p:cNvSpPr>
+            <a:spLocks noGrp="1"/>
+          </p:cNvSpPr>
+          <p:nvPr>
+            <p:ph type="title"/>
+          </p:nvPr>
+        </p:nvSpPr>
+        <p:spPr/>
+        <p:txBody>
+          <a:bodyPr/>
+          <a:lstStyle/>
+          <a:p>
+            <a:r>
+              <a:rPr lang="en-US" dirty="0"/>
+              <a:t>Discussion</a:t>
+            </a:r>
+          </a:p>
+        </p:txBody>
+      </p:sp>
+      <p:sp>
+        <p:nvSpPr>
+          <p:cNvPr id="3" name="Content Placeholder 2">
+            <a:extLst>
+              <a:ext uri="{FF2B5EF4-FFF2-40B4-BE49-F238E27FC236}">
+                <a16:creationId xmlns:a16="http://schemas.microsoft.com/office/drawing/2014/main" id="{71834931-5118-D891-7E41-0E779EF2B685}"/>
+              </a:ext>
+            </a:extLst>
+          </p:cNvPr>
+          <p:cNvSpPr>
+            <a:spLocks noGrp="1"/>
+          </p:cNvSpPr>
+          <p:nvPr>
+            <p:ph idx="1"/>
+          </p:nvPr>
+        </p:nvSpPr>
+        <p:spPr/>
+        <p:txBody>
+          <a:bodyPr>
+            <a:normAutofit/>
+          </a:bodyPr>
+          <a:lstStyle/>
+          <a:p>
+            <a:r>
+              <a:rPr lang="en-US" dirty="0"/>
+              <a:t>WRF model has a minimum and a maximum roughness – would you like me to use those?</a:t>
+            </a:r>
+          </a:p>
+          <a:p>
+            <a:pPr lvl="1"/>
+            <a:r>
+              <a:rPr lang="en-US" dirty="0" err="1"/>
+              <a:t>Chunxi</a:t>
+            </a:r>
+            <a:r>
+              <a:rPr lang="en-US" dirty="0"/>
+              <a:t> said it changes by season (but for forest, min and max are the same).</a:t>
+            </a:r>
+          </a:p>
+          <a:p>
+            <a:r>
+              <a:rPr lang="en-US" dirty="0"/>
+              <a:t>Still need to look into getting higher wind layers</a:t>
+            </a:r>
+          </a:p>
+          <a:p>
+            <a:pPr lvl="1"/>
+            <a:r>
+              <a:rPr lang="en-US" dirty="0"/>
+              <a:t>Downscaling calculation does not work if d is greater than 10 m!</a:t>
+            </a:r>
+          </a:p>
+          <a:p>
+            <a:pPr lvl="1"/>
+            <a:r>
+              <a:rPr lang="en-US" dirty="0"/>
+              <a:t>I had assumed the problem was downscaling</a:t>
+            </a:r>
+          </a:p>
+        </p:txBody>
+      </p:sp>
+    </p:spTree>
+    <p:extLst>
+      <p:ext uri="{BB962C8B-B14F-4D97-AF65-F5344CB8AC3E}">
+        <p14:creationId xmlns:p14="http://schemas.microsoft.com/office/powerpoint/2010/main" val="1244806186"/>
       </p:ext>
     </p:extLst>
   </p:cSld>
@@ -21083,7 +21093,7 @@
             </a:r>
             <a:r>
               <a:rPr lang="en-US" dirty="0"/>
-              <a:t> (20.664650 °N, 156.233308 W)</a:t>
+              <a:t> (20.674650 °N, 156.233308 W)</a:t>
             </a:r>
           </a:p>
           <a:p>

</xml_diff>